<commit_message>
PPT and Doc Update...
</commit_message>
<xml_diff>
--- a/ PPT's and Documents/PPT.pptx
+++ b/ PPT's and Documents/PPT.pptx
@@ -22,21 +22,22 @@
     <p:sldId id="267" r:id="rId17"/>
     <p:sldId id="268" r:id="rId18"/>
     <p:sldId id="269" r:id="rId19"/>
+    <p:sldId id="270" r:id="rId20"/>
   </p:sldIdLst>
   <p:sldSz cy="6858000" cx="9144000"/>
   <p:notesSz cx="6858000" cy="9144000"/>
   <p:embeddedFontLst>
     <p:embeddedFont>
       <p:font typeface="Source Code Pro"/>
-      <p:regular r:id="rId20"/>
-      <p:bold r:id="rId21"/>
-      <p:italic r:id="rId22"/>
-      <p:boldItalic r:id="rId23"/>
+      <p:regular r:id="rId21"/>
+      <p:bold r:id="rId22"/>
+      <p:italic r:id="rId23"/>
+      <p:boldItalic r:id="rId24"/>
     </p:embeddedFont>
     <p:embeddedFont>
       <p:font typeface="Oswald"/>
-      <p:regular r:id="rId24"/>
-      <p:bold r:id="rId25"/>
+      <p:regular r:id="rId25"/>
+      <p:bold r:id="rId26"/>
     </p:embeddedFont>
   </p:embeddedFontLst>
   <p:defaultTextStyle>
@@ -930,46 +931,7 @@
       </p:grpSpPr>
       <p:sp>
         <p:nvSpPr>
-          <p:cNvPr id="125" name="Google Shape;125;p12:notes"/>
-          <p:cNvSpPr txBox="1"/>
-          <p:nvPr>
-            <p:ph idx="1" type="body"/>
-          </p:nvPr>
-        </p:nvSpPr>
-        <p:spPr>
-          <a:xfrm>
-            <a:off x="685800" y="4343400"/>
-            <a:ext cx="5486400" cy="4114800"/>
-          </a:xfrm>
-          <a:prstGeom prst="rect">
-            <a:avLst/>
-          </a:prstGeom>
-        </p:spPr>
-        <p:txBody>
-          <a:bodyPr anchorCtr="0" anchor="t" bIns="91425" lIns="91425" spcFirstLastPara="1" rIns="91425" wrap="square" tIns="91425">
-            <a:noAutofit/>
-          </a:bodyPr>
-          <a:lstStyle/>
-          <a:p>
-            <a:pPr indent="0" lvl="0" marL="0" rtl="0" algn="l">
-              <a:spcBef>
-                <a:spcPts val="0"/>
-              </a:spcBef>
-              <a:spcAft>
-                <a:spcPts val="0"/>
-              </a:spcAft>
-              <a:buNone/>
-            </a:pPr>
-            <a:r>
-              <a:t/>
-            </a:r>
-            <a:endParaRPr/>
-          </a:p>
-        </p:txBody>
-      </p:sp>
-      <p:sp>
-        <p:nvSpPr>
-          <p:cNvPr id="126" name="Google Shape;126;p12:notes"/>
+          <p:cNvPr id="125" name="Google Shape;125;g25000616b6f_0_0:notes"/>
           <p:cNvSpPr/>
           <p:nvPr>
             <p:ph idx="2" type="sldImg"/>
@@ -978,7 +940,7 @@
         <p:spPr>
           <a:xfrm>
             <a:off x="1143225" y="685800"/>
-            <a:ext cx="4572225" cy="3429000"/>
+            <a:ext cx="4572300" cy="3429000"/>
           </a:xfrm>
           <a:custGeom>
             <a:rect b="b" l="l" r="r" t="t"/>
@@ -1002,34 +964,9 @@
           </a:custGeom>
         </p:spPr>
       </p:sp>
-    </p:spTree>
-  </p:cSld>
-  <p:clrMapOvr>
-    <a:masterClrMapping/>
-  </p:clrMapOvr>
-</p:notes>
-</file>
-
-<file path=ppt/notesSlides/notesSlide12.xml><?xml version="1.0" encoding="utf-8"?>
-<p:notes xmlns:a="http://schemas.openxmlformats.org/drawingml/2006/main" xmlns:r="http://schemas.openxmlformats.org/officeDocument/2006/relationships" xmlns:mc="http://schemas.openxmlformats.org/markup-compatibility/2006" xmlns:mv="urn:schemas-microsoft-com:mac:vml" xmlns:p="http://schemas.openxmlformats.org/presentationml/2006/main" xmlns:c="http://schemas.openxmlformats.org/drawingml/2006/chart" xmlns:dgm="http://schemas.openxmlformats.org/drawingml/2006/diagram" xmlns:o="urn:schemas-microsoft-com:office:office" xmlns:v="urn:schemas-microsoft-com:vml" xmlns:pvml="urn:schemas-microsoft-com:office:powerpoint" xmlns:com="http://schemas.openxmlformats.org/drawingml/2006/compatibility" xmlns:p14="http://schemas.microsoft.com/office/powerpoint/2010/main" xmlns:p15="http://schemas.microsoft.com/office/powerpoint/2012/main" xmlns:ahyp="http://schemas.microsoft.com/office/drawing/2018/hyperlinkcolor" showMasterPhAnim="0" showMasterSp="0">
-  <p:cSld>
-    <p:spTree>
-      <p:nvGrpSpPr>
-        <p:cNvPr id="130" name="Shape 130"/>
-        <p:cNvGrpSpPr/>
-        <p:nvPr/>
-      </p:nvGrpSpPr>
-      <p:grpSpPr>
-        <a:xfrm>
-          <a:off x="0" y="0"/>
-          <a:ext cx="0" cy="0"/>
-          <a:chOff x="0" y="0"/>
-          <a:chExt cx="0" cy="0"/>
-        </a:xfrm>
-      </p:grpSpPr>
       <p:sp>
         <p:nvSpPr>
-          <p:cNvPr id="131" name="Google Shape;131;p13:notes"/>
+          <p:cNvPr id="126" name="Google Shape;126;g25000616b6f_0_0:notes"/>
           <p:cNvSpPr txBox="1"/>
           <p:nvPr>
             <p:ph idx="1" type="body"/>
@@ -1066,9 +1003,73 @@
           </a:p>
         </p:txBody>
       </p:sp>
+    </p:spTree>
+  </p:cSld>
+  <p:clrMapOvr>
+    <a:masterClrMapping/>
+  </p:clrMapOvr>
+</p:notes>
+</file>
+
+<file path=ppt/notesSlides/notesSlide12.xml><?xml version="1.0" encoding="utf-8"?>
+<p:notes xmlns:a="http://schemas.openxmlformats.org/drawingml/2006/main" xmlns:r="http://schemas.openxmlformats.org/officeDocument/2006/relationships" xmlns:mc="http://schemas.openxmlformats.org/markup-compatibility/2006" xmlns:mv="urn:schemas-microsoft-com:mac:vml" xmlns:p="http://schemas.openxmlformats.org/presentationml/2006/main" xmlns:c="http://schemas.openxmlformats.org/drawingml/2006/chart" xmlns:dgm="http://schemas.openxmlformats.org/drawingml/2006/diagram" xmlns:o="urn:schemas-microsoft-com:office:office" xmlns:v="urn:schemas-microsoft-com:vml" xmlns:pvml="urn:schemas-microsoft-com:office:powerpoint" xmlns:com="http://schemas.openxmlformats.org/drawingml/2006/compatibility" xmlns:p14="http://schemas.microsoft.com/office/powerpoint/2010/main" xmlns:p15="http://schemas.microsoft.com/office/powerpoint/2012/main" xmlns:ahyp="http://schemas.microsoft.com/office/drawing/2018/hyperlinkcolor" showMasterPhAnim="0" showMasterSp="0">
+  <p:cSld>
+    <p:spTree>
+      <p:nvGrpSpPr>
+        <p:cNvPr id="129" name="Shape 129"/>
+        <p:cNvGrpSpPr/>
+        <p:nvPr/>
+      </p:nvGrpSpPr>
+      <p:grpSpPr>
+        <a:xfrm>
+          <a:off x="0" y="0"/>
+          <a:ext cx="0" cy="0"/>
+          <a:chOff x="0" y="0"/>
+          <a:chExt cx="0" cy="0"/>
+        </a:xfrm>
+      </p:grpSpPr>
       <p:sp>
         <p:nvSpPr>
-          <p:cNvPr id="132" name="Google Shape;132;p13:notes"/>
+          <p:cNvPr id="130" name="Google Shape;130;p12:notes"/>
+          <p:cNvSpPr txBox="1"/>
+          <p:nvPr>
+            <p:ph idx="1" type="body"/>
+          </p:nvPr>
+        </p:nvSpPr>
+        <p:spPr>
+          <a:xfrm>
+            <a:off x="685800" y="4343400"/>
+            <a:ext cx="5486400" cy="4114800"/>
+          </a:xfrm>
+          <a:prstGeom prst="rect">
+            <a:avLst/>
+          </a:prstGeom>
+        </p:spPr>
+        <p:txBody>
+          <a:bodyPr anchorCtr="0" anchor="t" bIns="91425" lIns="91425" spcFirstLastPara="1" rIns="91425" wrap="square" tIns="91425">
+            <a:noAutofit/>
+          </a:bodyPr>
+          <a:lstStyle/>
+          <a:p>
+            <a:pPr indent="0" lvl="0" marL="0" rtl="0" algn="l">
+              <a:spcBef>
+                <a:spcPts val="0"/>
+              </a:spcBef>
+              <a:spcAft>
+                <a:spcPts val="0"/>
+              </a:spcAft>
+              <a:buNone/>
+            </a:pPr>
+            <a:r>
+              <a:t/>
+            </a:r>
+            <a:endParaRPr/>
+          </a:p>
+        </p:txBody>
+      </p:sp>
+      <p:sp>
+        <p:nvSpPr>
+          <p:cNvPr id="131" name="Google Shape;131;p12:notes"/>
           <p:cNvSpPr/>
           <p:nvPr>
             <p:ph idx="2" type="sldImg"/>
@@ -1114,7 +1115,7 @@
   <p:cSld>
     <p:spTree>
       <p:nvGrpSpPr>
-        <p:cNvPr id="136" name="Shape 136"/>
+        <p:cNvPr id="135" name="Shape 135"/>
         <p:cNvGrpSpPr/>
         <p:nvPr/>
       </p:nvGrpSpPr>
@@ -1128,7 +1129,7 @@
       </p:grpSpPr>
       <p:sp>
         <p:nvSpPr>
-          <p:cNvPr id="137" name="Google Shape;137;p14:notes"/>
+          <p:cNvPr id="136" name="Google Shape;136;p13:notes"/>
           <p:cNvSpPr txBox="1"/>
           <p:nvPr>
             <p:ph idx="1" type="body"/>
@@ -1167,7 +1168,7 @@
       </p:sp>
       <p:sp>
         <p:nvSpPr>
-          <p:cNvPr id="138" name="Google Shape;138;p14:notes"/>
+          <p:cNvPr id="137" name="Google Shape;137;p13:notes"/>
           <p:cNvSpPr/>
           <p:nvPr>
             <p:ph idx="2" type="sldImg"/>
@@ -1213,7 +1214,7 @@
   <p:cSld>
     <p:spTree>
       <p:nvGrpSpPr>
-        <p:cNvPr id="142" name="Shape 142"/>
+        <p:cNvPr id="141" name="Shape 141"/>
         <p:cNvGrpSpPr/>
         <p:nvPr/>
       </p:nvGrpSpPr>
@@ -1227,7 +1228,106 @@
       </p:grpSpPr>
       <p:sp>
         <p:nvSpPr>
-          <p:cNvPr id="143" name="Google Shape;143;g291f5bd69bf_0_514:notes"/>
+          <p:cNvPr id="142" name="Google Shape;142;p14:notes"/>
+          <p:cNvSpPr txBox="1"/>
+          <p:nvPr>
+            <p:ph idx="1" type="body"/>
+          </p:nvPr>
+        </p:nvSpPr>
+        <p:spPr>
+          <a:xfrm>
+            <a:off x="685800" y="4343400"/>
+            <a:ext cx="5486400" cy="4114800"/>
+          </a:xfrm>
+          <a:prstGeom prst="rect">
+            <a:avLst/>
+          </a:prstGeom>
+        </p:spPr>
+        <p:txBody>
+          <a:bodyPr anchorCtr="0" anchor="t" bIns="91425" lIns="91425" spcFirstLastPara="1" rIns="91425" wrap="square" tIns="91425">
+            <a:noAutofit/>
+          </a:bodyPr>
+          <a:lstStyle/>
+          <a:p>
+            <a:pPr indent="0" lvl="0" marL="0" rtl="0" algn="l">
+              <a:spcBef>
+                <a:spcPts val="0"/>
+              </a:spcBef>
+              <a:spcAft>
+                <a:spcPts val="0"/>
+              </a:spcAft>
+              <a:buNone/>
+            </a:pPr>
+            <a:r>
+              <a:t/>
+            </a:r>
+            <a:endParaRPr/>
+          </a:p>
+        </p:txBody>
+      </p:sp>
+      <p:sp>
+        <p:nvSpPr>
+          <p:cNvPr id="143" name="Google Shape;143;p14:notes"/>
+          <p:cNvSpPr/>
+          <p:nvPr>
+            <p:ph idx="2" type="sldImg"/>
+          </p:nvPr>
+        </p:nvSpPr>
+        <p:spPr>
+          <a:xfrm>
+            <a:off x="1143225" y="685800"/>
+            <a:ext cx="4572225" cy="3429000"/>
+          </a:xfrm>
+          <a:custGeom>
+            <a:rect b="b" l="l" r="r" t="t"/>
+            <a:pathLst>
+              <a:path extrusionOk="0" h="120000" w="120000">
+                <a:moveTo>
+                  <a:pt x="0" y="0"/>
+                </a:moveTo>
+                <a:lnTo>
+                  <a:pt x="120000" y="0"/>
+                </a:lnTo>
+                <a:lnTo>
+                  <a:pt x="120000" y="120000"/>
+                </a:lnTo>
+                <a:lnTo>
+                  <a:pt x="0" y="120000"/>
+                </a:lnTo>
+                <a:close/>
+              </a:path>
+            </a:pathLst>
+          </a:custGeom>
+        </p:spPr>
+      </p:sp>
+    </p:spTree>
+  </p:cSld>
+  <p:clrMapOvr>
+    <a:masterClrMapping/>
+  </p:clrMapOvr>
+</p:notes>
+</file>
+
+<file path=ppt/notesSlides/notesSlide15.xml><?xml version="1.0" encoding="utf-8"?>
+<p:notes xmlns:a="http://schemas.openxmlformats.org/drawingml/2006/main" xmlns:r="http://schemas.openxmlformats.org/officeDocument/2006/relationships" xmlns:mc="http://schemas.openxmlformats.org/markup-compatibility/2006" xmlns:mv="urn:schemas-microsoft-com:mac:vml" xmlns:p="http://schemas.openxmlformats.org/presentationml/2006/main" xmlns:c="http://schemas.openxmlformats.org/drawingml/2006/chart" xmlns:dgm="http://schemas.openxmlformats.org/drawingml/2006/diagram" xmlns:o="urn:schemas-microsoft-com:office:office" xmlns:v="urn:schemas-microsoft-com:vml" xmlns:pvml="urn:schemas-microsoft-com:office:powerpoint" xmlns:com="http://schemas.openxmlformats.org/drawingml/2006/compatibility" xmlns:p14="http://schemas.microsoft.com/office/powerpoint/2010/main" xmlns:p15="http://schemas.microsoft.com/office/powerpoint/2012/main" xmlns:ahyp="http://schemas.microsoft.com/office/drawing/2018/hyperlinkcolor" showMasterPhAnim="0" showMasterSp="0">
+  <p:cSld>
+    <p:spTree>
+      <p:nvGrpSpPr>
+        <p:cNvPr id="147" name="Shape 147"/>
+        <p:cNvGrpSpPr/>
+        <p:nvPr/>
+      </p:nvGrpSpPr>
+      <p:grpSpPr>
+        <a:xfrm>
+          <a:off x="0" y="0"/>
+          <a:ext cx="0" cy="0"/>
+          <a:chOff x="0" y="0"/>
+          <a:chExt cx="0" cy="0"/>
+        </a:xfrm>
+      </p:grpSpPr>
+      <p:sp>
+        <p:nvSpPr>
+          <p:cNvPr id="148" name="Google Shape;148;g291f5bd69bf_0_514:notes"/>
           <p:cNvSpPr/>
           <p:nvPr>
             <p:ph idx="2" type="sldImg"/>
@@ -1262,7 +1362,7 @@
       </p:sp>
       <p:sp>
         <p:nvSpPr>
-          <p:cNvPr id="144" name="Google Shape;144;g291f5bd69bf_0_514:notes"/>
+          <p:cNvPr id="149" name="Google Shape;149;g291f5bd69bf_0_514:notes"/>
           <p:cNvSpPr txBox="1"/>
           <p:nvPr>
             <p:ph idx="1" type="body"/>
@@ -8521,9 +8621,61 @@
           <a:chExt cx="0" cy="0"/>
         </a:xfrm>
       </p:grpSpPr>
+      <p:pic>
+        <p:nvPicPr>
+          <p:cNvPr id="128" name="Google Shape;128;p24"/>
+          <p:cNvPicPr preferRelativeResize="0"/>
+          <p:nvPr/>
+        </p:nvPicPr>
+        <p:blipFill rotWithShape="1">
+          <a:blip r:embed="rId3">
+            <a:alphaModFix/>
+          </a:blip>
+          <a:srcRect b="0" l="0" r="0" t="0"/>
+          <a:stretch/>
+        </p:blipFill>
+        <p:spPr>
+          <a:xfrm>
+            <a:off x="1870861" y="365712"/>
+            <a:ext cx="5664000" cy="6236700"/>
+          </a:xfrm>
+          <a:prstGeom prst="rect">
+            <a:avLst/>
+          </a:prstGeom>
+          <a:noFill/>
+          <a:ln>
+            <a:noFill/>
+          </a:ln>
+        </p:spPr>
+      </p:pic>
+    </p:spTree>
+  </p:cSld>
+  <p:clrMapOvr>
+    <a:masterClrMapping/>
+  </p:clrMapOvr>
+</p:sld>
+</file>
+
+<file path=ppt/slides/slide12.xml><?xml version="1.0" encoding="utf-8"?>
+<p:sld xmlns:a="http://schemas.openxmlformats.org/drawingml/2006/main" xmlns:r="http://schemas.openxmlformats.org/officeDocument/2006/relationships" xmlns:mc="http://schemas.openxmlformats.org/markup-compatibility/2006" xmlns:mv="urn:schemas-microsoft-com:mac:vml" xmlns:p="http://schemas.openxmlformats.org/presentationml/2006/main" xmlns:c="http://schemas.openxmlformats.org/drawingml/2006/chart" xmlns:dgm="http://schemas.openxmlformats.org/drawingml/2006/diagram" xmlns:o="urn:schemas-microsoft-com:office:office" xmlns:v="urn:schemas-microsoft-com:vml" xmlns:pvml="urn:schemas-microsoft-com:office:powerpoint" xmlns:com="http://schemas.openxmlformats.org/drawingml/2006/compatibility" xmlns:p14="http://schemas.microsoft.com/office/powerpoint/2010/main" xmlns:p15="http://schemas.microsoft.com/office/powerpoint/2012/main" xmlns:ahyp="http://schemas.microsoft.com/office/drawing/2018/hyperlinkcolor">
+  <p:cSld>
+    <p:spTree>
+      <p:nvGrpSpPr>
+        <p:cNvPr id="132" name="Shape 132"/>
+        <p:cNvGrpSpPr/>
+        <p:nvPr/>
+      </p:nvGrpSpPr>
+      <p:grpSpPr>
+        <a:xfrm>
+          <a:off x="0" y="0"/>
+          <a:ext cx="0" cy="0"/>
+          <a:chOff x="0" y="0"/>
+          <a:chExt cx="0" cy="0"/>
+        </a:xfrm>
+      </p:grpSpPr>
       <p:sp>
         <p:nvSpPr>
-          <p:cNvPr id="128" name="Google Shape;128;p24"/>
+          <p:cNvPr id="133" name="Google Shape;133;p25"/>
           <p:cNvSpPr txBox="1"/>
           <p:nvPr>
             <p:ph type="title"/>
@@ -8572,7 +8724,7 @@
       </p:sp>
       <p:sp>
         <p:nvSpPr>
-          <p:cNvPr id="129" name="Google Shape;129;p24"/>
+          <p:cNvPr id="134" name="Google Shape;134;p25"/>
           <p:cNvSpPr txBox="1"/>
           <p:nvPr>
             <p:ph idx="1" type="body"/>
@@ -8707,12 +8859,12 @@
 </p:sld>
 </file>
 
-<file path=ppt/slides/slide12.xml><?xml version="1.0" encoding="utf-8"?>
+<file path=ppt/slides/slide13.xml><?xml version="1.0" encoding="utf-8"?>
 <p:sld xmlns:a="http://schemas.openxmlformats.org/drawingml/2006/main" xmlns:r="http://schemas.openxmlformats.org/officeDocument/2006/relationships" xmlns:mc="http://schemas.openxmlformats.org/markup-compatibility/2006" xmlns:mv="urn:schemas-microsoft-com:mac:vml" xmlns:p="http://schemas.openxmlformats.org/presentationml/2006/main" xmlns:c="http://schemas.openxmlformats.org/drawingml/2006/chart" xmlns:dgm="http://schemas.openxmlformats.org/drawingml/2006/diagram" xmlns:o="urn:schemas-microsoft-com:office:office" xmlns:v="urn:schemas-microsoft-com:vml" xmlns:pvml="urn:schemas-microsoft-com:office:powerpoint" xmlns:com="http://schemas.openxmlformats.org/drawingml/2006/compatibility" xmlns:p14="http://schemas.microsoft.com/office/powerpoint/2010/main" xmlns:p15="http://schemas.microsoft.com/office/powerpoint/2012/main" xmlns:ahyp="http://schemas.microsoft.com/office/drawing/2018/hyperlinkcolor">
   <p:cSld>
     <p:spTree>
       <p:nvGrpSpPr>
-        <p:cNvPr id="133" name="Shape 133"/>
+        <p:cNvPr id="138" name="Shape 138"/>
         <p:cNvGrpSpPr/>
         <p:nvPr/>
       </p:nvGrpSpPr>
@@ -8726,7 +8878,7 @@
       </p:grpSpPr>
       <p:sp>
         <p:nvSpPr>
-          <p:cNvPr id="134" name="Google Shape;134;p25"/>
+          <p:cNvPr id="139" name="Google Shape;139;p26"/>
           <p:cNvSpPr txBox="1"/>
           <p:nvPr>
             <p:ph type="title"/>
@@ -8775,7 +8927,7 @@
       </p:sp>
       <p:sp>
         <p:nvSpPr>
-          <p:cNvPr id="135" name="Google Shape;135;p25"/>
+          <p:cNvPr id="140" name="Google Shape;140;p26"/>
           <p:cNvSpPr txBox="1"/>
           <p:nvPr>
             <p:ph idx="1" type="body"/>
@@ -8876,12 +9028,12 @@
 </p:sld>
 </file>
 
-<file path=ppt/slides/slide13.xml><?xml version="1.0" encoding="utf-8"?>
+<file path=ppt/slides/slide14.xml><?xml version="1.0" encoding="utf-8"?>
 <p:sld xmlns:a="http://schemas.openxmlformats.org/drawingml/2006/main" xmlns:r="http://schemas.openxmlformats.org/officeDocument/2006/relationships" xmlns:mc="http://schemas.openxmlformats.org/markup-compatibility/2006" xmlns:mv="urn:schemas-microsoft-com:mac:vml" xmlns:p="http://schemas.openxmlformats.org/presentationml/2006/main" xmlns:c="http://schemas.openxmlformats.org/drawingml/2006/chart" xmlns:dgm="http://schemas.openxmlformats.org/drawingml/2006/diagram" xmlns:o="urn:schemas-microsoft-com:office:office" xmlns:v="urn:schemas-microsoft-com:vml" xmlns:pvml="urn:schemas-microsoft-com:office:powerpoint" xmlns:com="http://schemas.openxmlformats.org/drawingml/2006/compatibility" xmlns:p14="http://schemas.microsoft.com/office/powerpoint/2010/main" xmlns:p15="http://schemas.microsoft.com/office/powerpoint/2012/main" xmlns:ahyp="http://schemas.microsoft.com/office/drawing/2018/hyperlinkcolor">
   <p:cSld>
     <p:spTree>
       <p:nvGrpSpPr>
-        <p:cNvPr id="139" name="Shape 139"/>
+        <p:cNvPr id="144" name="Shape 144"/>
         <p:cNvGrpSpPr/>
         <p:nvPr/>
       </p:nvGrpSpPr>
@@ -8895,7 +9047,7 @@
       </p:grpSpPr>
       <p:sp>
         <p:nvSpPr>
-          <p:cNvPr id="140" name="Google Shape;140;p26"/>
+          <p:cNvPr id="145" name="Google Shape;145;p27"/>
           <p:cNvSpPr txBox="1"/>
           <p:nvPr>
             <p:ph type="title"/>
@@ -8944,7 +9096,7 @@
       </p:sp>
       <p:sp>
         <p:nvSpPr>
-          <p:cNvPr id="141" name="Google Shape;141;p26"/>
+          <p:cNvPr id="146" name="Google Shape;146;p27"/>
           <p:cNvSpPr txBox="1"/>
           <p:nvPr>
             <p:ph idx="1" type="body"/>
@@ -9011,12 +9163,12 @@
 </p:sld>
 </file>
 
-<file path=ppt/slides/slide14.xml><?xml version="1.0" encoding="utf-8"?>
+<file path=ppt/slides/slide15.xml><?xml version="1.0" encoding="utf-8"?>
 <p:sld xmlns:a="http://schemas.openxmlformats.org/drawingml/2006/main" xmlns:r="http://schemas.openxmlformats.org/officeDocument/2006/relationships" xmlns:mc="http://schemas.openxmlformats.org/markup-compatibility/2006" xmlns:mv="urn:schemas-microsoft-com:mac:vml" xmlns:p="http://schemas.openxmlformats.org/presentationml/2006/main" xmlns:c="http://schemas.openxmlformats.org/drawingml/2006/chart" xmlns:dgm="http://schemas.openxmlformats.org/drawingml/2006/diagram" xmlns:o="urn:schemas-microsoft-com:office:office" xmlns:v="urn:schemas-microsoft-com:vml" xmlns:pvml="urn:schemas-microsoft-com:office:powerpoint" xmlns:com="http://schemas.openxmlformats.org/drawingml/2006/compatibility" xmlns:p14="http://schemas.microsoft.com/office/powerpoint/2010/main" xmlns:p15="http://schemas.microsoft.com/office/powerpoint/2012/main" xmlns:ahyp="http://schemas.microsoft.com/office/drawing/2018/hyperlinkcolor">
   <p:cSld>
     <p:spTree>
       <p:nvGrpSpPr>
-        <p:cNvPr id="145" name="Shape 145"/>
+        <p:cNvPr id="150" name="Shape 150"/>
         <p:cNvGrpSpPr/>
         <p:nvPr/>
       </p:nvGrpSpPr>
@@ -9030,7 +9182,7 @@
       </p:grpSpPr>
       <p:sp>
         <p:nvSpPr>
-          <p:cNvPr id="146" name="Google Shape;146;p27"/>
+          <p:cNvPr id="151" name="Google Shape;151;p28"/>
           <p:cNvSpPr txBox="1"/>
           <p:nvPr>
             <p:ph type="title"/>

</xml_diff>